<commit_message>
Added slide about next meeting
</commit_message>
<xml_diff>
--- a/slides/GED_Python_Workgroup_2020_03_04.pptx
+++ b/slides/GED_Python_Workgroup_2020_03_04.pptx
@@ -2,13 +2,14 @@
 <file path=ppt/presentation.xml><?xml version="1.0" encoding="utf-8"?>
 <p:presentation xmlns:a="http://schemas.openxmlformats.org/drawingml/2006/main" xmlns:r="http://schemas.openxmlformats.org/officeDocument/2006/relationships" xmlns:p="http://schemas.openxmlformats.org/presentationml/2006/main" saveSubsetFonts="1">
   <p:sldMasterIdLst>
-    <p:sldMasterId id="2147483648" r:id="rId6"/>
+    <p:sldMasterId id="2147483648" r:id="rId7"/>
   </p:sldMasterIdLst>
   <p:sldIdLst>
-    <p:sldId id="256" r:id="rId7"/>
-    <p:sldId id="257" r:id="rId8"/>
-    <p:sldId id="259" r:id="rId9"/>
-    <p:sldId id="258" r:id="rId10"/>
+    <p:sldId id="256" r:id="rId8"/>
+    <p:sldId id="257" r:id="rId9"/>
+    <p:sldId id="259" r:id="rId10"/>
+    <p:sldId id="258" r:id="rId11"/>
+    <p:sldId id="260" r:id="rId12"/>
   </p:sldIdLst>
   <p:sldSz cx="12192000" cy="6858000"/>
   <p:notesSz cx="6858000" cy="9144000"/>
@@ -255,7 +256,7 @@
           <a:p>
             <a:fld id="{008BD8B9-5B15-4C0C-9B4A-FA7DA058E908}" type="datetimeFigureOut">
               <a:rPr lang="en-US" smtClean="0"/>
-              <a:t>3/4/2020</a:t>
+              <a:t>3/5/2020</a:t>
             </a:fld>
             <a:endParaRPr lang="en-US"/>
           </a:p>
@@ -423,7 +424,7 @@
           <a:p>
             <a:fld id="{008BD8B9-5B15-4C0C-9B4A-FA7DA058E908}" type="datetimeFigureOut">
               <a:rPr lang="en-US" smtClean="0"/>
-              <a:t>3/4/2020</a:t>
+              <a:t>3/5/2020</a:t>
             </a:fld>
             <a:endParaRPr lang="en-US"/>
           </a:p>
@@ -601,7 +602,7 @@
           <a:p>
             <a:fld id="{008BD8B9-5B15-4C0C-9B4A-FA7DA058E908}" type="datetimeFigureOut">
               <a:rPr lang="en-US" smtClean="0"/>
-              <a:t>3/4/2020</a:t>
+              <a:t>3/5/2020</a:t>
             </a:fld>
             <a:endParaRPr lang="en-US"/>
           </a:p>
@@ -769,7 +770,7 @@
           <a:p>
             <a:fld id="{008BD8B9-5B15-4C0C-9B4A-FA7DA058E908}" type="datetimeFigureOut">
               <a:rPr lang="en-US" smtClean="0"/>
-              <a:t>3/4/2020</a:t>
+              <a:t>3/5/2020</a:t>
             </a:fld>
             <a:endParaRPr lang="en-US"/>
           </a:p>
@@ -1014,7 +1015,7 @@
           <a:p>
             <a:fld id="{008BD8B9-5B15-4C0C-9B4A-FA7DA058E908}" type="datetimeFigureOut">
               <a:rPr lang="en-US" smtClean="0"/>
-              <a:t>3/4/2020</a:t>
+              <a:t>3/5/2020</a:t>
             </a:fld>
             <a:endParaRPr lang="en-US"/>
           </a:p>
@@ -1243,7 +1244,7 @@
           <a:p>
             <a:fld id="{008BD8B9-5B15-4C0C-9B4A-FA7DA058E908}" type="datetimeFigureOut">
               <a:rPr lang="en-US" smtClean="0"/>
-              <a:t>3/4/2020</a:t>
+              <a:t>3/5/2020</a:t>
             </a:fld>
             <a:endParaRPr lang="en-US"/>
           </a:p>
@@ -1607,7 +1608,7 @@
           <a:p>
             <a:fld id="{008BD8B9-5B15-4C0C-9B4A-FA7DA058E908}" type="datetimeFigureOut">
               <a:rPr lang="en-US" smtClean="0"/>
-              <a:t>3/4/2020</a:t>
+              <a:t>3/5/2020</a:t>
             </a:fld>
             <a:endParaRPr lang="en-US"/>
           </a:p>
@@ -1724,7 +1725,7 @@
           <a:p>
             <a:fld id="{008BD8B9-5B15-4C0C-9B4A-FA7DA058E908}" type="datetimeFigureOut">
               <a:rPr lang="en-US" smtClean="0"/>
-              <a:t>3/4/2020</a:t>
+              <a:t>3/5/2020</a:t>
             </a:fld>
             <a:endParaRPr lang="en-US"/>
           </a:p>
@@ -1819,7 +1820,7 @@
           <a:p>
             <a:fld id="{008BD8B9-5B15-4C0C-9B4A-FA7DA058E908}" type="datetimeFigureOut">
               <a:rPr lang="en-US" smtClean="0"/>
-              <a:t>3/4/2020</a:t>
+              <a:t>3/5/2020</a:t>
             </a:fld>
             <a:endParaRPr lang="en-US"/>
           </a:p>
@@ -2094,7 +2095,7 @@
           <a:p>
             <a:fld id="{008BD8B9-5B15-4C0C-9B4A-FA7DA058E908}" type="datetimeFigureOut">
               <a:rPr lang="en-US" smtClean="0"/>
-              <a:t>3/4/2020</a:t>
+              <a:t>3/5/2020</a:t>
             </a:fld>
             <a:endParaRPr lang="en-US"/>
           </a:p>
@@ -2346,7 +2347,7 @@
           <a:p>
             <a:fld id="{008BD8B9-5B15-4C0C-9B4A-FA7DA058E908}" type="datetimeFigureOut">
               <a:rPr lang="en-US" smtClean="0"/>
-              <a:t>3/4/2020</a:t>
+              <a:t>3/5/2020</a:t>
             </a:fld>
             <a:endParaRPr lang="en-US"/>
           </a:p>
@@ -2557,7 +2558,7 @@
           <a:p>
             <a:fld id="{008BD8B9-5B15-4C0C-9B4A-FA7DA058E908}" type="datetimeFigureOut">
               <a:rPr lang="en-US" smtClean="0"/>
-              <a:t>3/4/2020</a:t>
+              <a:t>3/5/2020</a:t>
             </a:fld>
             <a:endParaRPr lang="en-US"/>
           </a:p>
@@ -3262,7 +3263,7 @@
           <a:p>
             <a:r>
               <a:rPr lang="en-US" sz="3000" dirty="0"/>
-              <a:t>Week3_lesson1_webNLCD.md</a:t>
+              <a:t>Week3_lesson1_webCensus.md</a:t>
             </a:r>
           </a:p>
           <a:p>
@@ -3301,7 +3302,7 @@
           <a:p>
             <a:r>
               <a:rPr lang="en-US" sz="3000" dirty="0"/>
-              <a:t>Week3_lesson2_fileNames.md</a:t>
+              <a:t>Week3_lesson2_fileList.md</a:t>
             </a:r>
           </a:p>
           <a:p>
@@ -3338,10 +3339,9 @@
               <a:t>QC_data.shp</a:t>
             </a:r>
             <a:r>
-              <a:rPr lang="en-US"/>
+              <a:rPr lang="en-US" dirty="0"/>
               <a:t> in zip file</a:t>
             </a:r>
-            <a:endParaRPr lang="en-US" dirty="0"/>
           </a:p>
         </p:txBody>
       </p:sp>
@@ -3511,6 +3511,76 @@
     <p:extLst>
       <p:ext uri="{BB962C8B-B14F-4D97-AF65-F5344CB8AC3E}">
         <p14:creationId xmlns:p14="http://schemas.microsoft.com/office/powerpoint/2010/main" val="358517798"/>
+      </p:ext>
+    </p:extLst>
+  </p:cSld>
+  <p:clrMapOvr>
+    <a:masterClrMapping/>
+  </p:clrMapOvr>
+</p:sld>
+</file>
+
+<file path=ppt/slides/slide5.xml><?xml version="1.0" encoding="utf-8"?>
+<p:sld xmlns:a="http://schemas.openxmlformats.org/drawingml/2006/main" xmlns:r="http://schemas.openxmlformats.org/officeDocument/2006/relationships" xmlns:p="http://schemas.openxmlformats.org/presentationml/2006/main">
+  <p:cSld>
+    <p:spTree>
+      <p:nvGrpSpPr>
+        <p:cNvPr id="1" name=""/>
+        <p:cNvGrpSpPr/>
+        <p:nvPr/>
+      </p:nvGrpSpPr>
+      <p:grpSpPr>
+        <a:xfrm>
+          <a:off x="0" y="0"/>
+          <a:ext cx="0" cy="0"/>
+          <a:chOff x="0" y="0"/>
+          <a:chExt cx="0" cy="0"/>
+        </a:xfrm>
+      </p:grpSpPr>
+      <p:sp>
+        <p:nvSpPr>
+          <p:cNvPr id="2" name="Title 1">
+            <a:extLst>
+              <a:ext uri="{FF2B5EF4-FFF2-40B4-BE49-F238E27FC236}">
+                <a16:creationId xmlns:a16="http://schemas.microsoft.com/office/drawing/2014/main" id="{654BCBC1-52BB-43F7-B44E-6AF6FE5999D4}"/>
+              </a:ext>
+            </a:extLst>
+          </p:cNvPr>
+          <p:cNvSpPr>
+            <a:spLocks noGrp="1"/>
+          </p:cNvSpPr>
+          <p:nvPr>
+            <p:ph type="title"/>
+          </p:nvPr>
+        </p:nvSpPr>
+        <p:spPr>
+          <a:xfrm>
+            <a:off x="515983" y="2673531"/>
+            <a:ext cx="10515600" cy="2004197"/>
+          </a:xfrm>
+        </p:spPr>
+        <p:txBody>
+          <a:bodyPr>
+            <a:noAutofit/>
+          </a:bodyPr>
+          <a:lstStyle/>
+          <a:p>
+            <a:pPr algn="ctr"/>
+            <a:r>
+              <a:rPr lang="en-US" sz="5400" dirty="0"/>
+              <a:t>Next week currently schedule in Building 67 Room 116</a:t>
+            </a:r>
+            <a:br>
+              <a:rPr lang="en-US" sz="5400" dirty="0"/>
+            </a:br>
+            <a:endParaRPr lang="en-US" sz="5400" dirty="0"/>
+          </a:p>
+        </p:txBody>
+      </p:sp>
+    </p:spTree>
+    <p:extLst>
+      <p:ext uri="{BB962C8B-B14F-4D97-AF65-F5344CB8AC3E}">
+        <p14:creationId xmlns:p14="http://schemas.microsoft.com/office/powerpoint/2010/main" val="3861934453"/>
       </p:ext>
     </p:extLst>
   </p:cSld>
@@ -3850,7 +3920,38 @@
 </EsriMapsInfo>
 </file>
 
+<file path=customXml/item6.xml><?xml version="1.0" encoding="utf-8"?>
+<EsriMapsInfo xmlns="ESRI.ArcGIS.Mapping.OfficeIntegration.PowerPointInfo">
+  <Version>Version1</Version>
+  <RequiresSignIn>False</RequiresSignIn>
+</EsriMapsInfo>
+</file>
+
 <file path=customXml/itemProps1.xml><?xml version="1.0" encoding="utf-8"?>
+<ds:datastoreItem xmlns:ds="http://schemas.openxmlformats.org/officeDocument/2006/customXml" ds:itemID="{2529BFE0-C659-4B14-93D9-C5BF5F4D7D9F}">
+  <ds:schemaRefs>
+    <ds:schemaRef ds:uri="ESRI.ArcGIS.Mapping.OfficeIntegration.PowerPointInfo"/>
+  </ds:schemaRefs>
+</ds:datastoreItem>
+</file>
+
+<file path=customXml/itemProps2.xml><?xml version="1.0" encoding="utf-8"?>
+<ds:datastoreItem xmlns:ds="http://schemas.openxmlformats.org/officeDocument/2006/customXml" ds:itemID="{7DFDC938-BEEA-4A97-92F0-1CA545FCC3A8}">
+  <ds:schemaRefs>
+    <ds:schemaRef ds:uri="ESRI.ArcGIS.Mapping.OfficeIntegration.PowerPointInfo"/>
+  </ds:schemaRefs>
+</ds:datastoreItem>
+</file>
+
+<file path=customXml/itemProps3.xml><?xml version="1.0" encoding="utf-8"?>
+<ds:datastoreItem xmlns:ds="http://schemas.openxmlformats.org/officeDocument/2006/customXml" ds:itemID="{873A7533-8B90-41E2-A52A-CFDF269AF38C}">
+  <ds:schemaRefs>
+    <ds:schemaRef ds:uri="ESRI.ArcGIS.Mapping.OfficeIntegration.PowerPointInfo"/>
+  </ds:schemaRefs>
+</ds:datastoreItem>
+</file>
+
+<file path=customXml/itemProps4.xml><?xml version="1.0" encoding="utf-8"?>
 <ds:datastoreItem xmlns:ds="http://schemas.openxmlformats.org/officeDocument/2006/customXml" ds:itemID="{2798D0C8-98D0-48E6-B0BF-06A5EAF42623}">
   <ds:schemaRefs>
     <ds:schemaRef ds:uri="ESRI.ArcGIS.Mapping.OfficeIntegration.PowerPointInfo"/>
@@ -3858,32 +3959,16 @@
 </ds:datastoreItem>
 </file>
 
-<file path=customXml/itemProps2.xml><?xml version="1.0" encoding="utf-8"?>
-<ds:datastoreItem xmlns:ds="http://schemas.openxmlformats.org/officeDocument/2006/customXml" ds:itemID="{873A7533-8B90-41E2-A52A-CFDF269AF38C}">
+<file path=customXml/itemProps5.xml><?xml version="1.0" encoding="utf-8"?>
+<ds:datastoreItem xmlns:ds="http://schemas.openxmlformats.org/officeDocument/2006/customXml" ds:itemID="{08E1231B-65AC-4F7B-9312-C906EE0C4B7C}">
   <ds:schemaRefs>
     <ds:schemaRef ds:uri="ESRI.ArcGIS.Mapping.OfficeIntegration.PowerPointInfo"/>
   </ds:schemaRefs>
 </ds:datastoreItem>
 </file>
 
-<file path=customXml/itemProps3.xml><?xml version="1.0" encoding="utf-8"?>
-<ds:datastoreItem xmlns:ds="http://schemas.openxmlformats.org/officeDocument/2006/customXml" ds:itemID="{7DFDC938-BEEA-4A97-92F0-1CA545FCC3A8}">
-  <ds:schemaRefs>
-    <ds:schemaRef ds:uri="ESRI.ArcGIS.Mapping.OfficeIntegration.PowerPointInfo"/>
-  </ds:schemaRefs>
-</ds:datastoreItem>
-</file>
-
-<file path=customXml/itemProps4.xml><?xml version="1.0" encoding="utf-8"?>
-<ds:datastoreItem xmlns:ds="http://schemas.openxmlformats.org/officeDocument/2006/customXml" ds:itemID="{2529BFE0-C659-4B14-93D9-C5BF5F4D7D9F}">
-  <ds:schemaRefs>
-    <ds:schemaRef ds:uri="ESRI.ArcGIS.Mapping.OfficeIntegration.PowerPointInfo"/>
-  </ds:schemaRefs>
-</ds:datastoreItem>
-</file>
-
-<file path=customXml/itemProps5.xml><?xml version="1.0" encoding="utf-8"?>
-<ds:datastoreItem xmlns:ds="http://schemas.openxmlformats.org/officeDocument/2006/customXml" ds:itemID="{E1247C4C-29C9-4ECC-B5C3-585FB243804E}">
+<file path=customXml/itemProps6.xml><?xml version="1.0" encoding="utf-8"?>
+<ds:datastoreItem xmlns:ds="http://schemas.openxmlformats.org/officeDocument/2006/customXml" ds:itemID="{040E757A-AF9A-4937-827E-0DC4B9A918D2}">
   <ds:schemaRefs>
     <ds:schemaRef ds:uri="ESRI.ArcGIS.Mapping.OfficeIntegration.PowerPointInfo"/>
   </ds:schemaRefs>

</xml_diff>